<commit_message>
change code on slides, add links for download
</commit_message>
<xml_diff>
--- a/SlidesPPT/ShortCourse_FoSR.pptx
+++ b/SlidesPPT/ShortCourse_FoSR.pptx
@@ -26,13 +26,13 @@
     <p:sldId id="382" r:id="rId14"/>
     <p:sldId id="348" r:id="rId15"/>
     <p:sldId id="385" r:id="rId16"/>
-    <p:sldId id="386" r:id="rId17"/>
-    <p:sldId id="387" r:id="rId18"/>
-    <p:sldId id="388" r:id="rId19"/>
-    <p:sldId id="389" r:id="rId20"/>
-    <p:sldId id="390" r:id="rId21"/>
-    <p:sldId id="391" r:id="rId22"/>
-    <p:sldId id="392" r:id="rId23"/>
+    <p:sldId id="394" r:id="rId17"/>
+    <p:sldId id="386" r:id="rId18"/>
+    <p:sldId id="387" r:id="rId19"/>
+    <p:sldId id="388" r:id="rId20"/>
+    <p:sldId id="389" r:id="rId21"/>
+    <p:sldId id="390" r:id="rId22"/>
+    <p:sldId id="391" r:id="rId23"/>
     <p:sldId id="393" r:id="rId24"/>
   </p:sldIdLst>
   <p:sldSz cx="12192000" cy="6858000"/>
@@ -258,7 +258,7 @@
           <a:p>
             <a:fld id="{42DE4DD6-0497-4073-A07F-BACAF3B5AA44}" type="datetimeFigureOut">
               <a:rPr lang="en-US" smtClean="0"/>
-              <a:t>7/28/19</a:t>
+              <a:t>3/14/21</a:t>
             </a:fld>
             <a:endParaRPr lang="en-US"/>
           </a:p>
@@ -423,7 +423,7 @@
           <a:p>
             <a:fld id="{B1EB5D17-1482-4B71-829E-DEE524F3DC4D}" type="datetimeFigureOut">
               <a:rPr lang="en-US" smtClean="0"/>
-              <a:t>7/28/19</a:t>
+              <a:t>3/14/21</a:t>
             </a:fld>
             <a:endParaRPr lang="en-US"/>
           </a:p>
@@ -1303,7 +1303,7 @@
     </p:spTree>
     <p:extLst>
       <p:ext uri="{BB962C8B-B14F-4D97-AF65-F5344CB8AC3E}">
-        <p14:creationId xmlns:p14="http://schemas.microsoft.com/office/powerpoint/2010/main" val="1270353645"/>
+        <p14:creationId xmlns:p14="http://schemas.microsoft.com/office/powerpoint/2010/main" val="1428740322"/>
       </p:ext>
     </p:extLst>
   </p:cSld>
@@ -1392,7 +1392,7 @@
     </p:spTree>
     <p:extLst>
       <p:ext uri="{BB962C8B-B14F-4D97-AF65-F5344CB8AC3E}">
-        <p14:creationId xmlns:p14="http://schemas.microsoft.com/office/powerpoint/2010/main" val="1472526427"/>
+        <p14:creationId xmlns:p14="http://schemas.microsoft.com/office/powerpoint/2010/main" val="1270353645"/>
       </p:ext>
     </p:extLst>
   </p:cSld>
@@ -1481,7 +1481,7 @@
     </p:spTree>
     <p:extLst>
       <p:ext uri="{BB962C8B-B14F-4D97-AF65-F5344CB8AC3E}">
-        <p14:creationId xmlns:p14="http://schemas.microsoft.com/office/powerpoint/2010/main" val="1044810357"/>
+        <p14:creationId xmlns:p14="http://schemas.microsoft.com/office/powerpoint/2010/main" val="1472526427"/>
       </p:ext>
     </p:extLst>
   </p:cSld>
@@ -1570,7 +1570,7 @@
     </p:spTree>
     <p:extLst>
       <p:ext uri="{BB962C8B-B14F-4D97-AF65-F5344CB8AC3E}">
-        <p14:creationId xmlns:p14="http://schemas.microsoft.com/office/powerpoint/2010/main" val="835053072"/>
+        <p14:creationId xmlns:p14="http://schemas.microsoft.com/office/powerpoint/2010/main" val="1044810357"/>
       </p:ext>
     </p:extLst>
   </p:cSld>
@@ -1659,7 +1659,7 @@
     </p:spTree>
     <p:extLst>
       <p:ext uri="{BB962C8B-B14F-4D97-AF65-F5344CB8AC3E}">
-        <p14:creationId xmlns:p14="http://schemas.microsoft.com/office/powerpoint/2010/main" val="1057467606"/>
+        <p14:creationId xmlns:p14="http://schemas.microsoft.com/office/powerpoint/2010/main" val="835053072"/>
       </p:ext>
     </p:extLst>
   </p:cSld>
@@ -1837,7 +1837,7 @@
     </p:spTree>
     <p:extLst>
       <p:ext uri="{BB962C8B-B14F-4D97-AF65-F5344CB8AC3E}">
-        <p14:creationId xmlns:p14="http://schemas.microsoft.com/office/powerpoint/2010/main" val="217927115"/>
+        <p14:creationId xmlns:p14="http://schemas.microsoft.com/office/powerpoint/2010/main" val="1057467606"/>
       </p:ext>
     </p:extLst>
   </p:cSld>
@@ -1926,7 +1926,7 @@
     </p:spTree>
     <p:extLst>
       <p:ext uri="{BB962C8B-B14F-4D97-AF65-F5344CB8AC3E}">
-        <p14:creationId xmlns:p14="http://schemas.microsoft.com/office/powerpoint/2010/main" val="33831681"/>
+        <p14:creationId xmlns:p14="http://schemas.microsoft.com/office/powerpoint/2010/main" val="217927115"/>
       </p:ext>
     </p:extLst>
   </p:cSld>
@@ -2742,9 +2742,9 @@
                     <a:lumMod val="75000"/>
                   </a:schemeClr>
                 </a:solidFill>
-                <a:latin typeface="Proxima Nova" panose="02000506030000020004" pitchFamily="2" charset="0"/>
-                <a:ea typeface="Proxima Nova" panose="02000506030000020004" pitchFamily="2" charset="0"/>
-                <a:cs typeface="Proxima Nova" panose="02000506030000020004" pitchFamily="2" charset="0"/>
+                <a:latin typeface="Proxima Nova Rg" panose="02000506030000020004" pitchFamily="2" charset="0"/>
+                <a:ea typeface="Proxima Nova Rg" panose="02000506030000020004" pitchFamily="2" charset="0"/>
+                <a:cs typeface="Proxima Nova Rg" panose="02000506030000020004" pitchFamily="2" charset="0"/>
               </a:defRPr>
             </a:lvl1pPr>
             <a:lvl2pPr marL="257145" indent="0" algn="ctr">
@@ -3002,7 +3002,7 @@
                 <a:spcPts val="0"/>
               </a:spcBef>
               <a:defRPr sz="2400">
-                <a:latin typeface="Proxima Nova" panose="02000506030000020004" pitchFamily="2" charset="0"/>
+                <a:latin typeface="Proxima Nova Rg" panose="02000506030000020004" pitchFamily="2" charset="0"/>
               </a:defRPr>
             </a:lvl1pPr>
             <a:lvl2pPr marL="417860">
@@ -3016,7 +3016,7 @@
                 <a:solidFill>
                   <a:srgbClr val="389DAA"/>
                 </a:solidFill>
-                <a:latin typeface="Proxima Nova" panose="02000506030000020004" pitchFamily="2" charset="0"/>
+                <a:latin typeface="Proxima Nova Rg" panose="02000506030000020004" pitchFamily="2" charset="0"/>
               </a:defRPr>
             </a:lvl2pPr>
             <a:lvl3pPr>
@@ -4467,7 +4467,7 @@
             <a:srgbClr val="286FB7"/>
           </a:solidFill>
           <a:effectLst/>
-          <a:latin typeface="Proxima Nova" panose="02000506030000020004" pitchFamily="2" charset="0"/>
+          <a:latin typeface="Proxima Nova Rg" panose="02000506030000020004" pitchFamily="2" charset="0"/>
           <a:ea typeface="+mn-ea"/>
           <a:cs typeface="+mn-cs"/>
         </a:defRPr>
@@ -4492,7 +4492,7 @@
             <a:srgbClr val="389DAA"/>
           </a:solidFill>
           <a:effectLst/>
-          <a:latin typeface="Proxima Nova" panose="02000506030000020004" pitchFamily="2" charset="0"/>
+          <a:latin typeface="Proxima Nova Rg" panose="02000506030000020004" pitchFamily="2" charset="0"/>
           <a:ea typeface="+mn-ea"/>
           <a:cs typeface="+mn-cs"/>
         </a:defRPr>
@@ -5657,7 +5657,13 @@
       </p:sp>
       <p:pic>
         <p:nvPicPr>
-          <p:cNvPr id="3" name="Picture 2"/>
+          <p:cNvPr id="6" name="Picture 5" descr="Graphical user interface, text, application, email&#10;&#10;Description automatically generated">
+            <a:extLst>
+              <a:ext uri="{FF2B5EF4-FFF2-40B4-BE49-F238E27FC236}">
+                <a16:creationId xmlns:a16="http://schemas.microsoft.com/office/drawing/2014/main" id="{68951413-035E-884F-9322-37B4E5633D60}"/>
+              </a:ext>
+            </a:extLst>
+          </p:cNvPr>
           <p:cNvPicPr>
             <a:picLocks noChangeAspect="1"/>
           </p:cNvPicPr>
@@ -5677,38 +5683,8 @@
         </p:blipFill>
         <p:spPr>
           <a:xfrm>
-            <a:off x="2018287" y="1551880"/>
-            <a:ext cx="8155427" cy="1885880"/>
-          </a:xfrm>
-          <a:prstGeom prst="rect">
-            <a:avLst/>
-          </a:prstGeom>
-        </p:spPr>
-      </p:pic>
-      <p:pic>
-        <p:nvPicPr>
-          <p:cNvPr id="4" name="Picture 3"/>
-          <p:cNvPicPr>
-            <a:picLocks noChangeAspect="1"/>
-          </p:cNvPicPr>
-          <p:nvPr/>
-        </p:nvPicPr>
-        <p:blipFill>
-          <a:blip r:embed="rId4">
-            <a:extLst>
-              <a:ext uri="{28A0092B-C50C-407E-A947-70E740481C1C}">
-                <a14:useLocalDpi xmlns:a14="http://schemas.microsoft.com/office/drawing/2010/main" val="0"/>
-              </a:ext>
-            </a:extLst>
-          </a:blip>
-          <a:stretch>
-            <a:fillRect/>
-          </a:stretch>
-        </p:blipFill>
-        <p:spPr>
-          <a:xfrm>
-            <a:off x="2743199" y="3437760"/>
-            <a:ext cx="6705600" cy="3352800"/>
+            <a:off x="762000" y="1481688"/>
+            <a:ext cx="7759700" cy="3431808"/>
           </a:xfrm>
           <a:prstGeom prst="rect">
             <a:avLst/>
@@ -5770,7 +5746,13 @@
       </p:sp>
       <p:pic>
         <p:nvPicPr>
-          <p:cNvPr id="5" name="Picture 4"/>
+          <p:cNvPr id="4" name="Picture 3" descr="Chart&#10;&#10;Description automatically generated">
+            <a:extLst>
+              <a:ext uri="{FF2B5EF4-FFF2-40B4-BE49-F238E27FC236}">
+                <a16:creationId xmlns:a16="http://schemas.microsoft.com/office/drawing/2014/main" id="{A6672994-7638-2746-887A-D7850A72FFDE}"/>
+              </a:ext>
+            </a:extLst>
+          </p:cNvPr>
           <p:cNvPicPr>
             <a:picLocks noChangeAspect="1"/>
           </p:cNvPicPr>
@@ -5790,8 +5772,8 @@
         </p:blipFill>
         <p:spPr>
           <a:xfrm>
-            <a:off x="1950076" y="1752600"/>
-            <a:ext cx="8229600" cy="2292170"/>
+            <a:off x="2770909" y="1447800"/>
+            <a:ext cx="6650182" cy="4572000"/>
           </a:xfrm>
           <a:prstGeom prst="rect">
             <a:avLst/>
@@ -5801,7 +5783,7 @@
     </p:spTree>
     <p:extLst>
       <p:ext uri="{BB962C8B-B14F-4D97-AF65-F5344CB8AC3E}">
-        <p14:creationId xmlns:p14="http://schemas.microsoft.com/office/powerpoint/2010/main" val="1122435099"/>
+        <p14:creationId xmlns:p14="http://schemas.microsoft.com/office/powerpoint/2010/main" val="1616083009"/>
       </p:ext>
     </p:extLst>
   </p:cSld>
@@ -5853,7 +5835,13 @@
       </p:sp>
       <p:pic>
         <p:nvPicPr>
-          <p:cNvPr id="3" name="Picture 2"/>
+          <p:cNvPr id="4" name="Picture 3" descr="Text&#10;&#10;Description automatically generated">
+            <a:extLst>
+              <a:ext uri="{FF2B5EF4-FFF2-40B4-BE49-F238E27FC236}">
+                <a16:creationId xmlns:a16="http://schemas.microsoft.com/office/drawing/2014/main" id="{4CB21FBD-C669-1040-9E37-5EF610D8A811}"/>
+              </a:ext>
+            </a:extLst>
+          </p:cNvPr>
           <p:cNvPicPr>
             <a:picLocks noChangeAspect="1"/>
           </p:cNvPicPr>
@@ -5873,8 +5861,44 @@
         </p:blipFill>
         <p:spPr>
           <a:xfrm>
-            <a:off x="2362200" y="1905000"/>
-            <a:ext cx="7467600" cy="3733800"/>
+            <a:off x="644611" y="1676400"/>
+            <a:ext cx="8210749" cy="1183076"/>
+          </a:xfrm>
+          <a:prstGeom prst="rect">
+            <a:avLst/>
+          </a:prstGeom>
+        </p:spPr>
+      </p:pic>
+      <p:pic>
+        <p:nvPicPr>
+          <p:cNvPr id="7" name="Picture 6" descr="Text&#10;&#10;Description automatically generated with medium confidence">
+            <a:extLst>
+              <a:ext uri="{FF2B5EF4-FFF2-40B4-BE49-F238E27FC236}">
+                <a16:creationId xmlns:a16="http://schemas.microsoft.com/office/drawing/2014/main" id="{CBC064E6-194C-0448-9FEB-73F5B6CFE560}"/>
+              </a:ext>
+            </a:extLst>
+          </p:cNvPr>
+          <p:cNvPicPr>
+            <a:picLocks noChangeAspect="1"/>
+          </p:cNvPicPr>
+          <p:nvPr/>
+        </p:nvPicPr>
+        <p:blipFill>
+          <a:blip r:embed="rId4">
+            <a:extLst>
+              <a:ext uri="{28A0092B-C50C-407E-A947-70E740481C1C}">
+                <a14:useLocalDpi xmlns:a14="http://schemas.microsoft.com/office/drawing/2010/main" val="0"/>
+              </a:ext>
+            </a:extLst>
+          </a:blip>
+          <a:stretch>
+            <a:fillRect/>
+          </a:stretch>
+        </p:blipFill>
+        <p:spPr>
+          <a:xfrm>
+            <a:off x="615779" y="2812182"/>
+            <a:ext cx="8230973" cy="1233635"/>
           </a:xfrm>
           <a:prstGeom prst="rect">
             <a:avLst/>
@@ -5884,7 +5908,7 @@
     </p:spTree>
     <p:extLst>
       <p:ext uri="{BB962C8B-B14F-4D97-AF65-F5344CB8AC3E}">
-        <p14:creationId xmlns:p14="http://schemas.microsoft.com/office/powerpoint/2010/main" val="983813240"/>
+        <p14:creationId xmlns:p14="http://schemas.microsoft.com/office/powerpoint/2010/main" val="1122435099"/>
       </p:ext>
     </p:extLst>
   </p:cSld>
@@ -5936,6 +5960,184 @@
       </p:sp>
       <p:pic>
         <p:nvPicPr>
+          <p:cNvPr id="5" name="Picture 4" descr="Chart, line chart&#10;&#10;Description automatically generated">
+            <a:extLst>
+              <a:ext uri="{FF2B5EF4-FFF2-40B4-BE49-F238E27FC236}">
+                <a16:creationId xmlns:a16="http://schemas.microsoft.com/office/drawing/2014/main" id="{6935D65A-92C8-4442-8B1D-76380E994E88}"/>
+              </a:ext>
+            </a:extLst>
+          </p:cNvPr>
+          <p:cNvPicPr>
+            <a:picLocks noChangeAspect="1"/>
+          </p:cNvPicPr>
+          <p:nvPr/>
+        </p:nvPicPr>
+        <p:blipFill>
+          <a:blip r:embed="rId3">
+            <a:extLst>
+              <a:ext uri="{28A0092B-C50C-407E-A947-70E740481C1C}">
+                <a14:useLocalDpi xmlns:a14="http://schemas.microsoft.com/office/drawing/2010/main" val="0"/>
+              </a:ext>
+            </a:extLst>
+          </a:blip>
+          <a:stretch>
+            <a:fillRect/>
+          </a:stretch>
+        </p:blipFill>
+        <p:spPr>
+          <a:xfrm>
+            <a:off x="2514600" y="1423086"/>
+            <a:ext cx="6761018" cy="4648200"/>
+          </a:xfrm>
+          <a:prstGeom prst="rect">
+            <a:avLst/>
+          </a:prstGeom>
+        </p:spPr>
+      </p:pic>
+    </p:spTree>
+    <p:extLst>
+      <p:ext uri="{BB962C8B-B14F-4D97-AF65-F5344CB8AC3E}">
+        <p14:creationId xmlns:p14="http://schemas.microsoft.com/office/powerpoint/2010/main" val="983813240"/>
+      </p:ext>
+    </p:extLst>
+  </p:cSld>
+  <p:clrMapOvr>
+    <a:masterClrMapping/>
+  </p:clrMapOvr>
+</p:sld>
+</file>
+
+<file path=ppt/slides/slide19.xml><?xml version="1.0" encoding="utf-8"?>
+<p:sld xmlns:a="http://schemas.openxmlformats.org/drawingml/2006/main" xmlns:r="http://schemas.openxmlformats.org/officeDocument/2006/relationships" xmlns:p="http://schemas.openxmlformats.org/presentationml/2006/main">
+  <p:cSld>
+    <p:spTree>
+      <p:nvGrpSpPr>
+        <p:cNvPr id="1" name=""/>
+        <p:cNvGrpSpPr/>
+        <p:nvPr/>
+      </p:nvGrpSpPr>
+      <p:grpSpPr>
+        <a:xfrm>
+          <a:off x="0" y="0"/>
+          <a:ext cx="0" cy="0"/>
+          <a:chOff x="0" y="0"/>
+          <a:chExt cx="0" cy="0"/>
+        </a:xfrm>
+      </p:grpSpPr>
+      <p:sp>
+        <p:nvSpPr>
+          <p:cNvPr id="2" name="Title 1"/>
+          <p:cNvSpPr>
+            <a:spLocks noGrp="1"/>
+          </p:cNvSpPr>
+          <p:nvPr>
+            <p:ph type="title"/>
+          </p:nvPr>
+        </p:nvSpPr>
+        <p:spPr/>
+        <p:txBody>
+          <a:bodyPr/>
+          <a:lstStyle/>
+          <a:p>
+            <a:pPr algn="l"/>
+            <a:r>
+              <a:rPr lang="en-US" dirty="0"/>
+              <a:t>Code</a:t>
+            </a:r>
+          </a:p>
+        </p:txBody>
+      </p:sp>
+      <p:pic>
+        <p:nvPicPr>
+          <p:cNvPr id="5" name="Picture 4" descr="Text&#10;&#10;Description automatically generated">
+            <a:extLst>
+              <a:ext uri="{FF2B5EF4-FFF2-40B4-BE49-F238E27FC236}">
+                <a16:creationId xmlns:a16="http://schemas.microsoft.com/office/drawing/2014/main" id="{159E451C-FE1A-764A-9926-2B4DF2777E8E}"/>
+              </a:ext>
+            </a:extLst>
+          </p:cNvPr>
+          <p:cNvPicPr>
+            <a:picLocks noChangeAspect="1"/>
+          </p:cNvPicPr>
+          <p:nvPr/>
+        </p:nvPicPr>
+        <p:blipFill>
+          <a:blip r:embed="rId3">
+            <a:extLst>
+              <a:ext uri="{28A0092B-C50C-407E-A947-70E740481C1C}">
+                <a14:useLocalDpi xmlns:a14="http://schemas.microsoft.com/office/drawing/2010/main" val="0"/>
+              </a:ext>
+            </a:extLst>
+          </a:blip>
+          <a:stretch>
+            <a:fillRect/>
+          </a:stretch>
+        </p:blipFill>
+        <p:spPr>
+          <a:xfrm>
+            <a:off x="933450" y="2133600"/>
+            <a:ext cx="10325100" cy="1498600"/>
+          </a:xfrm>
+          <a:prstGeom prst="rect">
+            <a:avLst/>
+          </a:prstGeom>
+        </p:spPr>
+      </p:pic>
+    </p:spTree>
+    <p:extLst>
+      <p:ext uri="{BB962C8B-B14F-4D97-AF65-F5344CB8AC3E}">
+        <p14:creationId xmlns:p14="http://schemas.microsoft.com/office/powerpoint/2010/main" val="1961124759"/>
+      </p:ext>
+    </p:extLst>
+  </p:cSld>
+  <p:clrMapOvr>
+    <a:masterClrMapping/>
+  </p:clrMapOvr>
+</p:sld>
+</file>
+
+<file path=ppt/slides/slide2.xml><?xml version="1.0" encoding="utf-8"?>
+<p:sld xmlns:a="http://schemas.openxmlformats.org/drawingml/2006/main" xmlns:r="http://schemas.openxmlformats.org/officeDocument/2006/relationships" xmlns:p="http://schemas.openxmlformats.org/presentationml/2006/main">
+  <p:cSld>
+    <p:spTree>
+      <p:nvGrpSpPr>
+        <p:cNvPr id="1" name=""/>
+        <p:cNvGrpSpPr/>
+        <p:nvPr/>
+      </p:nvGrpSpPr>
+      <p:grpSpPr>
+        <a:xfrm>
+          <a:off x="0" y="0"/>
+          <a:ext cx="0" cy="0"/>
+          <a:chOff x="0" y="0"/>
+          <a:chExt cx="0" cy="0"/>
+        </a:xfrm>
+      </p:grpSpPr>
+      <p:sp>
+        <p:nvSpPr>
+          <p:cNvPr id="2" name="Title 1"/>
+          <p:cNvSpPr>
+            <a:spLocks noGrp="1"/>
+          </p:cNvSpPr>
+          <p:nvPr>
+            <p:ph type="title"/>
+          </p:nvPr>
+        </p:nvSpPr>
+        <p:spPr/>
+        <p:txBody>
+          <a:bodyPr/>
+          <a:lstStyle/>
+          <a:p>
+            <a:pPr algn="l"/>
+            <a:r>
+              <a:rPr lang="en-US" dirty="0"/>
+              <a:t>Motivation</a:t>
+            </a:r>
+          </a:p>
+        </p:txBody>
+      </p:sp>
+      <p:pic>
+        <p:nvPicPr>
           <p:cNvPr id="3" name="Picture 2"/>
           <p:cNvPicPr>
             <a:picLocks noChangeAspect="1"/>
@@ -5956,18 +6158,131 @@
         </p:blipFill>
         <p:spPr>
           <a:xfrm>
-            <a:off x="2133600" y="1577638"/>
-            <a:ext cx="8137666" cy="2259352"/>
+            <a:off x="2928473" y="1577638"/>
+            <a:ext cx="6335055" cy="4028500"/>
           </a:xfrm>
           <a:prstGeom prst="rect">
             <a:avLst/>
           </a:prstGeom>
         </p:spPr>
       </p:pic>
+      <p:sp>
+        <p:nvSpPr>
+          <p:cNvPr id="4" name="TextBox 3"/>
+          <p:cNvSpPr txBox="1"/>
+          <p:nvPr/>
+        </p:nvSpPr>
+        <p:spPr>
+          <a:xfrm>
+            <a:off x="1981200" y="5943601"/>
+            <a:ext cx="8229600" cy="461665"/>
+          </a:xfrm>
+          <a:prstGeom prst="rect">
+            <a:avLst/>
+          </a:prstGeom>
+          <a:noFill/>
+        </p:spPr>
+        <p:txBody>
+          <a:bodyPr wrap="square" rtlCol="0">
+            <a:spAutoFit/>
+          </a:bodyPr>
+          <a:lstStyle/>
+          <a:p>
+            <a:r>
+              <a:rPr lang="en-US" sz="1200" dirty="0">
+                <a:solidFill>
+                  <a:srgbClr val="286FB7"/>
+                </a:solidFill>
+              </a:rPr>
+              <a:t>J. A. </a:t>
+            </a:r>
+            <a:r>
+              <a:rPr lang="en-US" sz="1200" dirty="0" err="1">
+                <a:solidFill>
+                  <a:srgbClr val="286FB7"/>
+                </a:solidFill>
+              </a:rPr>
+              <a:t>Schrack</a:t>
+            </a:r>
+            <a:r>
+              <a:rPr lang="en-US" sz="1200" dirty="0">
+                <a:solidFill>
+                  <a:srgbClr val="286FB7"/>
+                </a:solidFill>
+              </a:rPr>
+              <a:t>, V. </a:t>
+            </a:r>
+            <a:r>
+              <a:rPr lang="en-US" sz="1200" dirty="0" err="1">
+                <a:solidFill>
+                  <a:srgbClr val="286FB7"/>
+                </a:solidFill>
+              </a:rPr>
+              <a:t>Zipunnikov</a:t>
+            </a:r>
+            <a:r>
+              <a:rPr lang="en-US" sz="1200" dirty="0">
+                <a:solidFill>
+                  <a:srgbClr val="286FB7"/>
+                </a:solidFill>
+              </a:rPr>
+              <a:t>, J. Goldsmith, J. Bai, E. M. </a:t>
+            </a:r>
+            <a:r>
+              <a:rPr lang="en-US" sz="1200" dirty="0" err="1">
+                <a:solidFill>
+                  <a:srgbClr val="286FB7"/>
+                </a:solidFill>
+              </a:rPr>
+              <a:t>Simonsick</a:t>
+            </a:r>
+            <a:r>
+              <a:rPr lang="en-US" sz="1200" dirty="0">
+                <a:solidFill>
+                  <a:srgbClr val="286FB7"/>
+                </a:solidFill>
+              </a:rPr>
+              <a:t>, C. M. </a:t>
+            </a:r>
+            <a:r>
+              <a:rPr lang="en-US" sz="1200" dirty="0" err="1">
+                <a:solidFill>
+                  <a:srgbClr val="286FB7"/>
+                </a:solidFill>
+              </a:rPr>
+              <a:t>Crainiceanu</a:t>
+            </a:r>
+            <a:r>
+              <a:rPr lang="en-US" sz="1200" dirty="0">
+                <a:solidFill>
+                  <a:srgbClr val="286FB7"/>
+                </a:solidFill>
+              </a:rPr>
+              <a:t>, L. </a:t>
+            </a:r>
+            <a:r>
+              <a:rPr lang="en-US" sz="1200" dirty="0" err="1">
+                <a:solidFill>
+                  <a:srgbClr val="286FB7"/>
+                </a:solidFill>
+              </a:rPr>
+              <a:t>Ferrucci</a:t>
+            </a:r>
+            <a:r>
+              <a:rPr lang="en-US" sz="1200" dirty="0">
+                <a:solidFill>
+                  <a:srgbClr val="286FB7"/>
+                </a:solidFill>
+              </a:rPr>
+              <a:t> (2014). Assessing the “Physical Cliff”: Detailed Quantification of Aging and Physical Activity. Journal of Gerontology: Medical Sciences, 69 973-979.</a:t>
+            </a:r>
+          </a:p>
+        </p:txBody>
+      </p:sp>
     </p:spTree>
     <p:extLst>
       <p:ext uri="{BB962C8B-B14F-4D97-AF65-F5344CB8AC3E}">
-        <p14:creationId xmlns:p14="http://schemas.microsoft.com/office/powerpoint/2010/main" val="1961124759"/>
+        <p14:creationId xmlns:p14="http://schemas.microsoft.com/office/powerpoint/2010/main" val="1482748850"/>
       </p:ext>
     </p:extLst>
   </p:cSld>
@@ -5977,7 +6292,7 @@
 </p:sld>
 </file>
 
-<file path=ppt/slides/slide19.xml><?xml version="1.0" encoding="utf-8"?>
+<file path=ppt/slides/slide20.xml><?xml version="1.0" encoding="utf-8"?>
 <p:sld xmlns:a="http://schemas.openxmlformats.org/drawingml/2006/main" xmlns:r="http://schemas.openxmlformats.org/officeDocument/2006/relationships" xmlns:p="http://schemas.openxmlformats.org/presentationml/2006/main">
   <p:cSld>
     <p:spTree>
@@ -6060,7 +6375,7 @@
 </p:sld>
 </file>
 
-<file path=ppt/slides/slide2.xml><?xml version="1.0" encoding="utf-8"?>
+<file path=ppt/slides/slide21.xml><?xml version="1.0" encoding="utf-8"?>
 <p:sld xmlns:a="http://schemas.openxmlformats.org/drawingml/2006/main" xmlns:r="http://schemas.openxmlformats.org/officeDocument/2006/relationships" xmlns:p="http://schemas.openxmlformats.org/presentationml/2006/main">
   <p:cSld>
     <p:spTree>
@@ -6095,14 +6410,20 @@
             <a:pPr algn="l"/>
             <a:r>
               <a:rPr lang="en-US" dirty="0"/>
-              <a:t>Motivation</a:t>
+              <a:t>Code</a:t>
             </a:r>
           </a:p>
         </p:txBody>
       </p:sp>
       <p:pic>
         <p:nvPicPr>
-          <p:cNvPr id="3" name="Picture 2"/>
+          <p:cNvPr id="5" name="Picture 4" descr="Text&#10;&#10;Description automatically generated">
+            <a:extLst>
+              <a:ext uri="{FF2B5EF4-FFF2-40B4-BE49-F238E27FC236}">
+                <a16:creationId xmlns:a16="http://schemas.microsoft.com/office/drawing/2014/main" id="{C6576173-2BE2-DF4E-A83C-01C8F254B0E8}"/>
+              </a:ext>
+            </a:extLst>
+          </p:cNvPr>
           <p:cNvPicPr>
             <a:picLocks noChangeAspect="1"/>
           </p:cNvPicPr>
@@ -6122,204 +6443,8 @@
         </p:blipFill>
         <p:spPr>
           <a:xfrm>
-            <a:off x="2928473" y="1577638"/>
-            <a:ext cx="6335055" cy="4028500"/>
-          </a:xfrm>
-          <a:prstGeom prst="rect">
-            <a:avLst/>
-          </a:prstGeom>
-        </p:spPr>
-      </p:pic>
-      <p:sp>
-        <p:nvSpPr>
-          <p:cNvPr id="4" name="TextBox 3"/>
-          <p:cNvSpPr txBox="1"/>
-          <p:nvPr/>
-        </p:nvSpPr>
-        <p:spPr>
-          <a:xfrm>
-            <a:off x="1981200" y="5943601"/>
-            <a:ext cx="8229600" cy="461665"/>
-          </a:xfrm>
-          <a:prstGeom prst="rect">
-            <a:avLst/>
-          </a:prstGeom>
-          <a:noFill/>
-        </p:spPr>
-        <p:txBody>
-          <a:bodyPr wrap="square" rtlCol="0">
-            <a:spAutoFit/>
-          </a:bodyPr>
-          <a:lstStyle/>
-          <a:p>
-            <a:r>
-              <a:rPr lang="en-US" sz="1200" dirty="0">
-                <a:solidFill>
-                  <a:srgbClr val="286FB7"/>
-                </a:solidFill>
-              </a:rPr>
-              <a:t>J. A. </a:t>
-            </a:r>
-            <a:r>
-              <a:rPr lang="en-US" sz="1200" dirty="0" err="1">
-                <a:solidFill>
-                  <a:srgbClr val="286FB7"/>
-                </a:solidFill>
-              </a:rPr>
-              <a:t>Schrack</a:t>
-            </a:r>
-            <a:r>
-              <a:rPr lang="en-US" sz="1200" dirty="0">
-                <a:solidFill>
-                  <a:srgbClr val="286FB7"/>
-                </a:solidFill>
-              </a:rPr>
-              <a:t>, V. </a:t>
-            </a:r>
-            <a:r>
-              <a:rPr lang="en-US" sz="1200" dirty="0" err="1">
-                <a:solidFill>
-                  <a:srgbClr val="286FB7"/>
-                </a:solidFill>
-              </a:rPr>
-              <a:t>Zipunnikov</a:t>
-            </a:r>
-            <a:r>
-              <a:rPr lang="en-US" sz="1200" dirty="0">
-                <a:solidFill>
-                  <a:srgbClr val="286FB7"/>
-                </a:solidFill>
-              </a:rPr>
-              <a:t>, J. Goldsmith, J. Bai, E. M. </a:t>
-            </a:r>
-            <a:r>
-              <a:rPr lang="en-US" sz="1200" dirty="0" err="1">
-                <a:solidFill>
-                  <a:srgbClr val="286FB7"/>
-                </a:solidFill>
-              </a:rPr>
-              <a:t>Simonsick</a:t>
-            </a:r>
-            <a:r>
-              <a:rPr lang="en-US" sz="1200" dirty="0">
-                <a:solidFill>
-                  <a:srgbClr val="286FB7"/>
-                </a:solidFill>
-              </a:rPr>
-              <a:t>, C. M. </a:t>
-            </a:r>
-            <a:r>
-              <a:rPr lang="en-US" sz="1200" dirty="0" err="1">
-                <a:solidFill>
-                  <a:srgbClr val="286FB7"/>
-                </a:solidFill>
-              </a:rPr>
-              <a:t>Crainiceanu</a:t>
-            </a:r>
-            <a:r>
-              <a:rPr lang="en-US" sz="1200" dirty="0">
-                <a:solidFill>
-                  <a:srgbClr val="286FB7"/>
-                </a:solidFill>
-              </a:rPr>
-              <a:t>, L. </a:t>
-            </a:r>
-            <a:r>
-              <a:rPr lang="en-US" sz="1200" dirty="0" err="1">
-                <a:solidFill>
-                  <a:srgbClr val="286FB7"/>
-                </a:solidFill>
-              </a:rPr>
-              <a:t>Ferrucci</a:t>
-            </a:r>
-            <a:r>
-              <a:rPr lang="en-US" sz="1200" dirty="0">
-                <a:solidFill>
-                  <a:srgbClr val="286FB7"/>
-                </a:solidFill>
-              </a:rPr>
-              <a:t> (2014). Assessing the “Physical Cliff”: Detailed Quantification of Aging and Physical Activity. Journal of Gerontology: Medical Sciences, 69 973-979.</a:t>
-            </a:r>
-          </a:p>
-        </p:txBody>
-      </p:sp>
-    </p:spTree>
-    <p:extLst>
-      <p:ext uri="{BB962C8B-B14F-4D97-AF65-F5344CB8AC3E}">
-        <p14:creationId xmlns:p14="http://schemas.microsoft.com/office/powerpoint/2010/main" val="1482748850"/>
-      </p:ext>
-    </p:extLst>
-  </p:cSld>
-  <p:clrMapOvr>
-    <a:masterClrMapping/>
-  </p:clrMapOvr>
-</p:sld>
-</file>
-
-<file path=ppt/slides/slide20.xml><?xml version="1.0" encoding="utf-8"?>
-<p:sld xmlns:a="http://schemas.openxmlformats.org/drawingml/2006/main" xmlns:r="http://schemas.openxmlformats.org/officeDocument/2006/relationships" xmlns:p="http://schemas.openxmlformats.org/presentationml/2006/main">
-  <p:cSld>
-    <p:spTree>
-      <p:nvGrpSpPr>
-        <p:cNvPr id="1" name=""/>
-        <p:cNvGrpSpPr/>
-        <p:nvPr/>
-      </p:nvGrpSpPr>
-      <p:grpSpPr>
-        <a:xfrm>
-          <a:off x="0" y="0"/>
-          <a:ext cx="0" cy="0"/>
-          <a:chOff x="0" y="0"/>
-          <a:chExt cx="0" cy="0"/>
-        </a:xfrm>
-      </p:grpSpPr>
-      <p:sp>
-        <p:nvSpPr>
-          <p:cNvPr id="2" name="Title 1"/>
-          <p:cNvSpPr>
-            <a:spLocks noGrp="1"/>
-          </p:cNvSpPr>
-          <p:nvPr>
-            <p:ph type="title"/>
-          </p:nvPr>
-        </p:nvSpPr>
-        <p:spPr/>
-        <p:txBody>
-          <a:bodyPr/>
-          <a:lstStyle/>
-          <a:p>
-            <a:pPr algn="l"/>
-            <a:r>
-              <a:rPr lang="en-US" dirty="0"/>
-              <a:t>Code</a:t>
-            </a:r>
-          </a:p>
-        </p:txBody>
-      </p:sp>
-      <p:pic>
-        <p:nvPicPr>
-          <p:cNvPr id="3" name="Picture 2"/>
-          <p:cNvPicPr>
-            <a:picLocks noChangeAspect="1"/>
-          </p:cNvPicPr>
-          <p:nvPr/>
-        </p:nvPicPr>
-        <p:blipFill>
-          <a:blip r:embed="rId3">
-            <a:extLst>
-              <a:ext uri="{28A0092B-C50C-407E-A947-70E740481C1C}">
-                <a14:useLocalDpi xmlns:a14="http://schemas.microsoft.com/office/drawing/2010/main" val="0"/>
-              </a:ext>
-            </a:extLst>
-          </a:blip>
-          <a:stretch>
-            <a:fillRect/>
-          </a:stretch>
-        </p:blipFill>
-        <p:spPr>
-          <a:xfrm>
-            <a:off x="2157816" y="1752601"/>
-            <a:ext cx="8056204" cy="2445457"/>
+            <a:off x="952500" y="2006600"/>
+            <a:ext cx="10287000" cy="2844800"/>
           </a:xfrm>
           <a:prstGeom prst="rect">
             <a:avLst/>
@@ -6339,7 +6464,7 @@
 </p:sld>
 </file>
 
-<file path=ppt/slides/slide21.xml><?xml version="1.0" encoding="utf-8"?>
+<file path=ppt/slides/slide22.xml><?xml version="1.0" encoding="utf-8"?>
 <p:sld xmlns:a="http://schemas.openxmlformats.org/drawingml/2006/main" xmlns:r="http://schemas.openxmlformats.org/officeDocument/2006/relationships" xmlns:p="http://schemas.openxmlformats.org/presentationml/2006/main">
   <p:cSld>
     <p:spTree>
@@ -6413,89 +6538,6 @@
     <p:extLst>
       <p:ext uri="{BB962C8B-B14F-4D97-AF65-F5344CB8AC3E}">
         <p14:creationId xmlns:p14="http://schemas.microsoft.com/office/powerpoint/2010/main" val="2140341316"/>
-      </p:ext>
-    </p:extLst>
-  </p:cSld>
-  <p:clrMapOvr>
-    <a:masterClrMapping/>
-  </p:clrMapOvr>
-</p:sld>
-</file>
-
-<file path=ppt/slides/slide22.xml><?xml version="1.0" encoding="utf-8"?>
-<p:sld xmlns:a="http://schemas.openxmlformats.org/drawingml/2006/main" xmlns:r="http://schemas.openxmlformats.org/officeDocument/2006/relationships" xmlns:p="http://schemas.openxmlformats.org/presentationml/2006/main">
-  <p:cSld>
-    <p:spTree>
-      <p:nvGrpSpPr>
-        <p:cNvPr id="1" name=""/>
-        <p:cNvGrpSpPr/>
-        <p:nvPr/>
-      </p:nvGrpSpPr>
-      <p:grpSpPr>
-        <a:xfrm>
-          <a:off x="0" y="0"/>
-          <a:ext cx="0" cy="0"/>
-          <a:chOff x="0" y="0"/>
-          <a:chExt cx="0" cy="0"/>
-        </a:xfrm>
-      </p:grpSpPr>
-      <p:sp>
-        <p:nvSpPr>
-          <p:cNvPr id="2" name="Title 1"/>
-          <p:cNvSpPr>
-            <a:spLocks noGrp="1"/>
-          </p:cNvSpPr>
-          <p:nvPr>
-            <p:ph type="title"/>
-          </p:nvPr>
-        </p:nvSpPr>
-        <p:spPr/>
-        <p:txBody>
-          <a:bodyPr/>
-          <a:lstStyle/>
-          <a:p>
-            <a:pPr algn="l"/>
-            <a:r>
-              <a:rPr lang="en-US" dirty="0"/>
-              <a:t>Code</a:t>
-            </a:r>
-          </a:p>
-        </p:txBody>
-      </p:sp>
-      <p:pic>
-        <p:nvPicPr>
-          <p:cNvPr id="3" name="Picture 2"/>
-          <p:cNvPicPr>
-            <a:picLocks noChangeAspect="1"/>
-          </p:cNvPicPr>
-          <p:nvPr/>
-        </p:nvPicPr>
-        <p:blipFill>
-          <a:blip r:embed="rId3">
-            <a:extLst>
-              <a:ext uri="{28A0092B-C50C-407E-A947-70E740481C1C}">
-                <a14:useLocalDpi xmlns:a14="http://schemas.microsoft.com/office/drawing/2010/main" val="0"/>
-              </a:ext>
-            </a:extLst>
-          </a:blip>
-          <a:stretch>
-            <a:fillRect/>
-          </a:stretch>
-        </p:blipFill>
-        <p:spPr>
-          <a:xfrm>
-            <a:off x="1981200" y="1905001"/>
-            <a:ext cx="8229600" cy="1080451"/>
-          </a:xfrm>
-          <a:prstGeom prst="rect">
-            <a:avLst/>
-          </a:prstGeom>
-        </p:spPr>
-      </p:pic>
-    </p:spTree>
-    <p:extLst>
-      <p:ext uri="{BB962C8B-B14F-4D97-AF65-F5344CB8AC3E}">
-        <p14:creationId xmlns:p14="http://schemas.microsoft.com/office/powerpoint/2010/main" val="95448570"/>
       </p:ext>
     </p:extLst>
   </p:cSld>

</xml_diff>

<commit_message>
more slide updates ...
</commit_message>
<xml_diff>
--- a/SlidesPPT/ShortCourse_FoSR.pptx
+++ b/SlidesPPT/ShortCourse_FoSR.pptx
@@ -4850,13 +4850,16 @@
           <a:p>
             <a:r>
               <a:rPr lang="en-US" dirty="0"/>
-              <a:t>Errors          are correlated within a subject, but variable selection methods assume independent errors</a:t>
-            </a:r>
-          </a:p>
-          <a:p>
-            <a:r>
-              <a:rPr lang="en-US" dirty="0"/>
-              <a:t>Three approaches:</a:t>
+              <a:t>Errors          are correlated within a subject, in a way that’s complex</a:t>
+            </a:r>
+          </a:p>
+          <a:p>
+            <a:endParaRPr lang="en-US" dirty="0"/>
+          </a:p>
+          <a:p>
+            <a:r>
+              <a:rPr lang="en-US" dirty="0"/>
+              <a:t>Three possible approaches:</a:t>
             </a:r>
           </a:p>
           <a:p>
@@ -4870,7 +4873,7 @@
             <a:pPr lvl="1"/>
             <a:r>
               <a:rPr lang="en-US" dirty="0"/>
-              <a:t>Use GLS in place of OLS by “pre-whitening” the left and right side of the matrix formulation of the model:</a:t>
+              <a:t> Use GLS in place of OLS by “pre-whitening” the left and right side of the matrix formulation of the model:</a:t>
             </a:r>
           </a:p>
           <a:p>
@@ -4884,7 +4887,7 @@
             <a:pPr lvl="1"/>
             <a:r>
               <a:rPr lang="en-US" dirty="0"/>
-              <a:t>Jointly model the coefficient vector and the residual covariance</a:t>
+              <a:t> Jointly model the coefficient vector and the residual covariance</a:t>
             </a:r>
           </a:p>
           <a:p>
@@ -4944,8 +4947,8 @@
         </p:blipFill>
         <p:spPr>
           <a:xfrm>
-            <a:off x="1828800" y="1472340"/>
-            <a:ext cx="469900" cy="275973"/>
+            <a:off x="1828799" y="1472340"/>
+            <a:ext cx="606945" cy="356460"/>
           </a:xfrm>
           <a:prstGeom prst="rect">
             <a:avLst/>
@@ -5092,7 +5095,7 @@
           <a:p>
             <a:r>
               <a:rPr lang="en-US" dirty="0"/>
-              <a:t>Alternatively, one can be careful about the dimension of the spline basis</a:t>
+              <a:t>Alternatively, one can be careful about the dimension of the basis</a:t>
             </a:r>
           </a:p>
           <a:p>

</xml_diff>